<commit_message>
Fixes #4 - adds v-if/v-else/v-show slides
</commit_message>
<xml_diff>
--- a/Slides/3_VueJS.pptx
+++ b/Slides/3_VueJS.pptx
@@ -5,7 +5,7 @@
     <p:sldMasterId id="2147483648" r:id="rId1"/>
   </p:sldMasterIdLst>
   <p:notesMasterIdLst>
-    <p:notesMasterId r:id="rId25"/>
+    <p:notesMasterId r:id="rId27"/>
   </p:notesMasterIdLst>
   <p:sldIdLst>
     <p:sldId id="256" r:id="rId2"/>
@@ -25,12 +25,14 @@
     <p:sldId id="314" r:id="rId16"/>
     <p:sldId id="317" r:id="rId17"/>
     <p:sldId id="318" r:id="rId18"/>
-    <p:sldId id="319" r:id="rId19"/>
-    <p:sldId id="320" r:id="rId20"/>
-    <p:sldId id="325" r:id="rId21"/>
-    <p:sldId id="323" r:id="rId22"/>
-    <p:sldId id="321" r:id="rId23"/>
-    <p:sldId id="322" r:id="rId24"/>
+    <p:sldId id="326" r:id="rId19"/>
+    <p:sldId id="327" r:id="rId20"/>
+    <p:sldId id="319" r:id="rId21"/>
+    <p:sldId id="320" r:id="rId22"/>
+    <p:sldId id="325" r:id="rId23"/>
+    <p:sldId id="323" r:id="rId24"/>
+    <p:sldId id="321" r:id="rId25"/>
+    <p:sldId id="322" r:id="rId26"/>
   </p:sldIdLst>
   <p:sldSz cx="12192000" cy="6858000"/>
   <p:notesSz cx="6858000" cy="9144000"/>
@@ -137,40 +139,6 @@
 </p:presentation>
 </file>
 
-<file path=ppt/ink/ink1.xml><?xml version="1.0" encoding="utf-8"?>
-<inkml:ink xmlns:inkml="http://www.w3.org/2003/InkML">
-  <inkml:definitions>
-    <inkml:context xml:id="ctx0">
-      <inkml:inkSource xml:id="inkSrc0">
-        <inkml:traceFormat>
-          <inkml:channel name="X" type="integer" max="3840" units="cm"/>
-          <inkml:channel name="Y" type="integer" max="1080" units="cm"/>
-          <inkml:channel name="T" type="integer" max="2.14748E9" units="dev"/>
-        </inkml:traceFormat>
-        <inkml:channelProperties>
-          <inkml:channelProperty channel="X" name="resolution" value="73.70441" units="1/cm"/>
-          <inkml:channelProperty channel="Y" name="resolution" value="36.86007" units="1/cm"/>
-          <inkml:channelProperty channel="T" name="resolution" value="1" units="1/dev"/>
-        </inkml:channelProperties>
-      </inkml:inkSource>
-      <inkml:timestamp xml:id="ts0" timeString="2021-08-18T13:56:56.574"/>
-    </inkml:context>
-    <inkml:brush xml:id="br0">
-      <inkml:brushProperty name="width" value="0.05292" units="cm"/>
-      <inkml:brushProperty name="height" value="0.05292" units="cm"/>
-      <inkml:brushProperty name="color" value="#FF0000"/>
-    </inkml:brush>
-  </inkml:definitions>
-  <inkml:trace contextRef="#ctx0" brushRef="#br0">17022 13458 0,'17'18'109,"-17"17"-109,18 36 16,-18-1-16,17-17 15,-17 36 1,0 140 0,0-35-1,0 18 1,0-1 0,0-70-1,-17-17 1,17-107-1,0 19 1,0-19 0,0 1 62</inkml:trace>
-  <inkml:trace contextRef="#ctx0" brushRef="#br0" timeOffset="1514.79">18503 13511 0,'0'0'0,"0"-17"0,-17 17 31,17-18-15,-71 18-1,36 0-15,-18 0 16,18 0 0,-36 0-1,-17 35 1,-36 89-1,18-1 1,18 1 0,35 17-1,36-18 1,17 36 0,53 18-1,0-19 1,17-34 15,18-36-15,1-18-1,-19 1 1,-17-71 0,18 0-1,87-18 1,1-123-1,-53-35 1,0 0 0,-89 105-1,1 18 1,-18 18 0,0 0-1,0-18 1,0 17-1,0-34 17,0-18-17,-71-54 1,18 1 0,1 71-1,16 17 1,1 18-1,-18-1 1,0 1 0,36 35-1,-1 0 1,18-18 0,-18 18 46</inkml:trace>
-  <inkml:trace contextRef="#ctx0" brushRef="#br0" timeOffset="2046.8">19156 13458 0,'0'-17'15</inkml:trace>
-  <inkml:trace contextRef="#ctx0" brushRef="#br0" timeOffset="2556.42">19121 14852 0,'0'0'0,"0"70"15,0-52-15,0-36 172</inkml:trace>
-  <inkml:trace contextRef="#ctx0" brushRef="#br0" timeOffset="3378.09">19720 13123 0,'0'18'16,"0"53"0,18-19-1,0 90 1,17-1 0,-18-53-1,-17-35-15,0 53 16,18 52-1,0 1 1,-1 88 0,1-88-1,-18 123 1,18-176 0,-18-36-1,0-52 1,0 0-1,0-1 17,0 1-1,0 0 78</inkml:trace>
-  <inkml:trace contextRef="#ctx0" brushRef="#br0" timeOffset="4687.91">20779 13635 0,'0'-18'15,"0"1"1,-18 17-16,0-18 16,-35 0-1,-17 18 1,17 0-16,18 0 16,-1 18-1,1 17 1,-53 142 15,53-1-15,-1-35-1,36 36 1,0-1 0,0-53-1,18 1 1,0-36-1,35 0 1,35 53 0,-53-88-1,0 0 1,1-35 0,-19 17-1,19-35 1,52 0 15,-35-53-15,52-53-1,19-35 1,-54 0 0,-34 71-1,-1 17 1,-35-18-1,0 18 1,0-35 0,0-18-1,0 18 1,-18-141 0,18 123-1,-17 53 1,-19-18-1,1 36 17,-35 0-17,17 17 1,-35 0 0,-18 1-1,18 17 1,52 0-1,19 17 79</inkml:trace>
-  <inkml:trace contextRef="#ctx0" brushRef="#br0" timeOffset="6412.33">21978 14323 0,'0'-18'16,"18"18"-1,-18-17 32,-18-1-31,-17 18-1,0 0-15,-18 0 32,0 35-17,-18 0 1,18 54 0,18 16-1,17 1 1,1-18-1,-1-17 1,18 0 0,0-19-1,0-34 1,0 0-16,18 17 16,17-17-1,18 17 1,0-35-1,17 18 17,-34-18-17,-1 0 1,0-18 0,0-53-1,1 1 1,-19-36-1,-17-17 1,0 70-16,18 0 16,0 17-1,-18 19 1,0-1 0,0 1 30,0-1-14,0-17-17,-18 17 1,0 18 0,18-18-1,0 1 1,0 52 78,18 18-79,0-18-15,-1 18 16,1 0-16,35 53 31,-18-36-15,-35 1-1,35-18 1,-17-18 0,0 0-1,17 18 1,0 0-1,0-17 1,1 52 0,-19-71-1,-17 1 1,0 0 0</inkml:trace>
-</inkml:ink>
-</file>
-
 <file path=ppt/notesMasters/notesMaster1.xml><?xml version="1.0" encoding="utf-8"?>
 <p:notesMaster xmlns:a="http://schemas.openxmlformats.org/drawingml/2006/main" xmlns:r="http://schemas.openxmlformats.org/officeDocument/2006/relationships" xmlns:p="http://schemas.openxmlformats.org/presentationml/2006/main">
   <p:cSld>
@@ -253,7 +221,7 @@
           <a:p>
             <a:fld id="{FE0698A4-8696-4B25-BC16-7D62971AF3FD}" type="datetimeFigureOut">
               <a:rPr lang="en-US" smtClean="0"/>
-              <a:t>8/18/2021</a:t>
+              <a:t>9/14/2021</a:t>
             </a:fld>
             <a:endParaRPr lang="en-US"/>
           </a:p>
@@ -669,7 +637,7 @@
           <a:p>
             <a:fld id="{0C7D6E66-10FD-47A2-AEEA-EC66FB893916}" type="slidenum">
               <a:rPr lang="en-US" smtClean="0"/>
-              <a:t>23</a:t>
+              <a:t>25</a:t>
             </a:fld>
             <a:endParaRPr lang="en-US"/>
           </a:p>
@@ -835,7 +803,7 @@
           <a:p>
             <a:fld id="{52B491D6-D58D-44B5-AD9D-0243D7ABB41E}" type="datetimeFigureOut">
               <a:rPr lang="en-US" smtClean="0"/>
-              <a:t>8/18/2021</a:t>
+              <a:t>9/14/2021</a:t>
             </a:fld>
             <a:endParaRPr lang="en-US"/>
           </a:p>
@@ -1033,7 +1001,7 @@
           <a:p>
             <a:fld id="{52B491D6-D58D-44B5-AD9D-0243D7ABB41E}" type="datetimeFigureOut">
               <a:rPr lang="en-US" smtClean="0"/>
-              <a:t>8/18/2021</a:t>
+              <a:t>9/14/2021</a:t>
             </a:fld>
             <a:endParaRPr lang="en-US"/>
           </a:p>
@@ -1241,7 +1209,7 @@
           <a:p>
             <a:fld id="{52B491D6-D58D-44B5-AD9D-0243D7ABB41E}" type="datetimeFigureOut">
               <a:rPr lang="en-US" smtClean="0"/>
-              <a:t>8/18/2021</a:t>
+              <a:t>9/14/2021</a:t>
             </a:fld>
             <a:endParaRPr lang="en-US"/>
           </a:p>
@@ -1627,7 +1595,7 @@
           <a:p>
             <a:fld id="{52B491D6-D58D-44B5-AD9D-0243D7ABB41E}" type="datetimeFigureOut">
               <a:rPr lang="en-US" smtClean="0"/>
-              <a:t>8/18/2021</a:t>
+              <a:t>9/14/2021</a:t>
             </a:fld>
             <a:endParaRPr lang="en-US"/>
           </a:p>
@@ -1902,7 +1870,7 @@
           <a:p>
             <a:fld id="{52B491D6-D58D-44B5-AD9D-0243D7ABB41E}" type="datetimeFigureOut">
               <a:rPr lang="en-US" smtClean="0"/>
-              <a:t>8/18/2021</a:t>
+              <a:t>9/14/2021</a:t>
             </a:fld>
             <a:endParaRPr lang="en-US"/>
           </a:p>
@@ -2167,7 +2135,7 @@
           <a:p>
             <a:fld id="{52B491D6-D58D-44B5-AD9D-0243D7ABB41E}" type="datetimeFigureOut">
               <a:rPr lang="en-US" smtClean="0"/>
-              <a:t>8/18/2021</a:t>
+              <a:t>9/14/2021</a:t>
             </a:fld>
             <a:endParaRPr lang="en-US"/>
           </a:p>
@@ -2579,7 +2547,7 @@
           <a:p>
             <a:fld id="{52B491D6-D58D-44B5-AD9D-0243D7ABB41E}" type="datetimeFigureOut">
               <a:rPr lang="en-US" smtClean="0"/>
-              <a:t>8/18/2021</a:t>
+              <a:t>9/14/2021</a:t>
             </a:fld>
             <a:endParaRPr lang="en-US"/>
           </a:p>
@@ -2720,7 +2688,7 @@
           <a:p>
             <a:fld id="{52B491D6-D58D-44B5-AD9D-0243D7ABB41E}" type="datetimeFigureOut">
               <a:rPr lang="en-US" smtClean="0"/>
-              <a:t>8/18/2021</a:t>
+              <a:t>9/14/2021</a:t>
             </a:fld>
             <a:endParaRPr lang="en-US"/>
           </a:p>
@@ -2833,7 +2801,7 @@
           <a:p>
             <a:fld id="{52B491D6-D58D-44B5-AD9D-0243D7ABB41E}" type="datetimeFigureOut">
               <a:rPr lang="en-US" smtClean="0"/>
-              <a:t>8/18/2021</a:t>
+              <a:t>9/14/2021</a:t>
             </a:fld>
             <a:endParaRPr lang="en-US"/>
           </a:p>
@@ -3144,7 +3112,7 @@
           <a:p>
             <a:fld id="{52B491D6-D58D-44B5-AD9D-0243D7ABB41E}" type="datetimeFigureOut">
               <a:rPr lang="en-US" smtClean="0"/>
-              <a:t>8/18/2021</a:t>
+              <a:t>9/14/2021</a:t>
             </a:fld>
             <a:endParaRPr lang="en-US"/>
           </a:p>
@@ -3432,7 +3400,7 @@
           <a:p>
             <a:fld id="{52B491D6-D58D-44B5-AD9D-0243D7ABB41E}" type="datetimeFigureOut">
               <a:rPr lang="en-US" smtClean="0"/>
-              <a:t>8/18/2021</a:t>
+              <a:t>9/14/2021</a:t>
             </a:fld>
             <a:endParaRPr lang="en-US"/>
           </a:p>
@@ -3673,7 +3641,7 @@
           <a:p>
             <a:fld id="{52B491D6-D58D-44B5-AD9D-0243D7ABB41E}" type="datetimeFigureOut">
               <a:rPr lang="en-US" smtClean="0"/>
-              <a:t>8/18/2021</a:t>
+              <a:t>9/14/2021</a:t>
             </a:fld>
             <a:endParaRPr lang="en-US"/>
           </a:p>
@@ -5165,7 +5133,7 @@
           <p:cNvPr id="2" name="Title 1">
             <a:extLst>
               <a:ext uri="{FF2B5EF4-FFF2-40B4-BE49-F238E27FC236}">
-                <a16:creationId xmlns:a16="http://schemas.microsoft.com/office/drawing/2014/main" id="{39A2F1DC-827E-486D-8F7C-0C10080401D9}"/>
+                <a16:creationId xmlns:a16="http://schemas.microsoft.com/office/drawing/2014/main" id="{BD47D23A-861C-4DE5-83FD-186F2BD3BDD1}"/>
               </a:ext>
             </a:extLst>
           </p:cNvPr>
@@ -5183,36 +5151,13 @@
           <a:p>
             <a:r>
               <a:rPr lang="en-US" dirty="0"/>
-              <a:t>Methods</a:t>
-            </a:r>
-          </a:p>
-        </p:txBody>
-      </p:sp>
-      <p:sp>
-        <p:nvSpPr>
-          <p:cNvPr id="3" name="Content Placeholder 2">
-            <a:extLst>
-              <a:ext uri="{FF2B5EF4-FFF2-40B4-BE49-F238E27FC236}">
-                <a16:creationId xmlns:a16="http://schemas.microsoft.com/office/drawing/2014/main" id="{2F05F660-3071-4BC2-8D9C-B97908EDF1E1}"/>
-              </a:ext>
-            </a:extLst>
-          </p:cNvPr>
-          <p:cNvSpPr>
-            <a:spLocks noGrp="1"/>
-          </p:cNvSpPr>
-          <p:nvPr>
-            <p:ph sz="half" idx="1"/>
-          </p:nvPr>
-        </p:nvSpPr>
-        <p:spPr/>
-        <p:txBody>
-          <a:bodyPr/>
-          <a:lstStyle/>
-          <a:p>
-            <a:r>
-              <a:rPr lang="en-US" dirty="0"/>
-              <a:t>Methods allow you to create event handlers that can be called directly from your templates.</a:t>
-            </a:r>
+              <a:t>v-if </a:t>
+            </a:r>
+            <a:r>
+              <a:rPr lang="en-US"/>
+              <a:t>/ v-else</a:t>
+            </a:r>
+            <a:endParaRPr lang="en-US" dirty="0"/>
           </a:p>
         </p:txBody>
       </p:sp>
@@ -5221,7 +5166,7 @@
           <p:cNvPr id="6" name="Content Placeholder 5">
             <a:extLst>
               <a:ext uri="{FF2B5EF4-FFF2-40B4-BE49-F238E27FC236}">
-                <a16:creationId xmlns:a16="http://schemas.microsoft.com/office/drawing/2014/main" id="{D363BD9F-3BE7-4BE1-A961-EAAD07B4BB8B}"/>
+                <a16:creationId xmlns:a16="http://schemas.microsoft.com/office/drawing/2014/main" id="{322964A5-3E72-4C6F-8148-7866631C5BFB}"/>
               </a:ext>
             </a:extLst>
           </p:cNvPr>
@@ -5229,7 +5174,7 @@
             <a:picLocks noGrp="1" noChangeAspect="1"/>
           </p:cNvPicPr>
           <p:nvPr>
-            <p:ph sz="half" idx="2"/>
+            <p:ph sz="half" idx="1"/>
           </p:nvPr>
         </p:nvPicPr>
         <p:blipFill>
@@ -5240,15 +5185,52 @@
         </p:blipFill>
         <p:spPr>
           <a:xfrm>
-            <a:off x="6172200" y="2430323"/>
-            <a:ext cx="5181600" cy="3141941"/>
+            <a:off x="838200" y="3010235"/>
+            <a:ext cx="5181600" cy="1982118"/>
           </a:xfrm>
         </p:spPr>
       </p:pic>
+      <p:sp>
+        <p:nvSpPr>
+          <p:cNvPr id="4" name="Content Placeholder 3">
+            <a:extLst>
+              <a:ext uri="{FF2B5EF4-FFF2-40B4-BE49-F238E27FC236}">
+                <a16:creationId xmlns:a16="http://schemas.microsoft.com/office/drawing/2014/main" id="{8D9CADE9-4999-416B-80C8-88595A6B4303}"/>
+              </a:ext>
+            </a:extLst>
+          </p:cNvPr>
+          <p:cNvSpPr>
+            <a:spLocks noGrp="1"/>
+          </p:cNvSpPr>
+          <p:nvPr>
+            <p:ph sz="half" idx="2"/>
+          </p:nvPr>
+        </p:nvSpPr>
+        <p:spPr/>
+        <p:txBody>
+          <a:bodyPr/>
+          <a:lstStyle/>
+          <a:p>
+            <a:r>
+              <a:rPr lang="en-US" dirty="0"/>
+              <a:t>Conditionally adds or hides content in the DOM</a:t>
+            </a:r>
+          </a:p>
+          <a:p>
+            <a:endParaRPr lang="en-US" dirty="0"/>
+          </a:p>
+          <a:p>
+            <a:r>
+              <a:rPr lang="en-US" dirty="0"/>
+              <a:t>If condition is TRUE, the content is added to DOM.  If condition is FALSE, content is removed.</a:t>
+            </a:r>
+          </a:p>
+        </p:txBody>
+      </p:sp>
     </p:spTree>
     <p:extLst>
       <p:ext uri="{BB962C8B-B14F-4D97-AF65-F5344CB8AC3E}">
-        <p14:creationId xmlns:p14="http://schemas.microsoft.com/office/powerpoint/2010/main" val="1126114387"/>
+        <p14:creationId xmlns:p14="http://schemas.microsoft.com/office/powerpoint/2010/main" val="2203729314"/>
       </p:ext>
     </p:extLst>
   </p:cSld>
@@ -5280,7 +5262,7 @@
           <p:cNvPr id="2" name="Title 1">
             <a:extLst>
               <a:ext uri="{FF2B5EF4-FFF2-40B4-BE49-F238E27FC236}">
-                <a16:creationId xmlns:a16="http://schemas.microsoft.com/office/drawing/2014/main" id="{39A2F1DC-827E-486D-8F7C-0C10080401D9}"/>
+                <a16:creationId xmlns:a16="http://schemas.microsoft.com/office/drawing/2014/main" id="{BD47D23A-861C-4DE5-83FD-186F2BD3BDD1}"/>
               </a:ext>
             </a:extLst>
           </p:cNvPr>
@@ -5298,17 +5280,17 @@
           <a:p>
             <a:r>
               <a:rPr lang="en-US" dirty="0"/>
-              <a:t>Methods</a:t>
+              <a:t>v-show</a:t>
             </a:r>
           </a:p>
         </p:txBody>
       </p:sp>
       <p:pic>
         <p:nvPicPr>
-          <p:cNvPr id="5" name="Content Placeholder 4">
-            <a:extLst>
-              <a:ext uri="{FF2B5EF4-FFF2-40B4-BE49-F238E27FC236}">
-                <a16:creationId xmlns:a16="http://schemas.microsoft.com/office/drawing/2014/main" id="{5F120647-64A1-4DB9-BF14-2FEA6E50A303}"/>
+          <p:cNvPr id="6" name="Content Placeholder 5">
+            <a:extLst>
+              <a:ext uri="{FF2B5EF4-FFF2-40B4-BE49-F238E27FC236}">
+                <a16:creationId xmlns:a16="http://schemas.microsoft.com/office/drawing/2014/main" id="{C368AD4E-9948-4769-931E-AB7AB65001DC}"/>
               </a:ext>
             </a:extLst>
           </p:cNvPr>
@@ -5327,85 +5309,61 @@
         </p:blipFill>
         <p:spPr>
           <a:xfrm>
-            <a:off x="838200" y="2899011"/>
-            <a:ext cx="5181600" cy="2204566"/>
+            <a:off x="838200" y="2940002"/>
+            <a:ext cx="5181600" cy="2122583"/>
           </a:xfrm>
         </p:spPr>
       </p:pic>
-      <p:pic>
-        <p:nvPicPr>
-          <p:cNvPr id="6" name="Content Placeholder 5">
-            <a:extLst>
-              <a:ext uri="{FF2B5EF4-FFF2-40B4-BE49-F238E27FC236}">
-                <a16:creationId xmlns:a16="http://schemas.microsoft.com/office/drawing/2014/main" id="{D363BD9F-3BE7-4BE1-A961-EAAD07B4BB8B}"/>
-              </a:ext>
-            </a:extLst>
-          </p:cNvPr>
-          <p:cNvPicPr>
-            <a:picLocks noGrp="1" noChangeAspect="1"/>
-          </p:cNvPicPr>
+      <p:sp>
+        <p:nvSpPr>
+          <p:cNvPr id="4" name="Content Placeholder 3">
+            <a:extLst>
+              <a:ext uri="{FF2B5EF4-FFF2-40B4-BE49-F238E27FC236}">
+                <a16:creationId xmlns:a16="http://schemas.microsoft.com/office/drawing/2014/main" id="{8D9CADE9-4999-416B-80C8-88595A6B4303}"/>
+              </a:ext>
+            </a:extLst>
+          </p:cNvPr>
+          <p:cNvSpPr>
+            <a:spLocks noGrp="1"/>
+          </p:cNvSpPr>
           <p:nvPr>
             <p:ph sz="half" idx="2"/>
           </p:nvPr>
-        </p:nvPicPr>
-        <p:blipFill>
-          <a:blip r:embed="rId3"/>
-          <a:stretch>
-            <a:fillRect/>
-          </a:stretch>
-        </p:blipFill>
-        <p:spPr>
-          <a:xfrm>
-            <a:off x="6172200" y="2430323"/>
-            <a:ext cx="5181600" cy="3141941"/>
-          </a:xfrm>
-        </p:spPr>
-      </p:pic>
-      <p:cxnSp>
-        <p:nvCxnSpPr>
-          <p:cNvPr id="8" name="Straight Arrow Connector 7">
-            <a:extLst>
-              <a:ext uri="{FF2B5EF4-FFF2-40B4-BE49-F238E27FC236}">
-                <a16:creationId xmlns:a16="http://schemas.microsoft.com/office/drawing/2014/main" id="{70849410-BB44-4C41-B69D-A202F2FEBF1E}"/>
-              </a:ext>
-            </a:extLst>
-          </p:cNvPr>
-          <p:cNvCxnSpPr>
-            <a:cxnSpLocks/>
-          </p:cNvCxnSpPr>
-          <p:nvPr/>
-        </p:nvCxnSpPr>
-        <p:spPr>
-          <a:xfrm>
-            <a:off x="2803490" y="3989196"/>
-            <a:ext cx="3808325" cy="351692"/>
-          </a:xfrm>
-          <a:prstGeom prst="straightConnector1">
-            <a:avLst/>
-          </a:prstGeom>
-          <a:ln w="57150">
-            <a:tailEnd type="triangle"/>
-          </a:ln>
-        </p:spPr>
-        <p:style>
-          <a:lnRef idx="1">
-            <a:schemeClr val="accent2"/>
-          </a:lnRef>
-          <a:fillRef idx="0">
-            <a:schemeClr val="accent2"/>
-          </a:fillRef>
-          <a:effectRef idx="0">
-            <a:schemeClr val="accent2"/>
-          </a:effectRef>
-          <a:fontRef idx="minor">
-            <a:schemeClr val="tx1"/>
-          </a:fontRef>
-        </p:style>
-      </p:cxnSp>
+        </p:nvSpPr>
+        <p:spPr/>
+        <p:txBody>
+          <a:bodyPr/>
+          <a:lstStyle/>
+          <a:p>
+            <a:r>
+              <a:rPr lang="en-US" dirty="0"/>
+              <a:t>Conditionally hides content in the DOM using “display: none”</a:t>
+            </a:r>
+          </a:p>
+          <a:p>
+            <a:endParaRPr lang="en-US" dirty="0"/>
+          </a:p>
+          <a:p>
+            <a:r>
+              <a:rPr lang="en-US" dirty="0"/>
+              <a:t>Useful for components if you need to maintain state</a:t>
+            </a:r>
+          </a:p>
+          <a:p>
+            <a:endParaRPr lang="en-US" dirty="0"/>
+          </a:p>
+          <a:p>
+            <a:r>
+              <a:rPr lang="en-US" dirty="0"/>
+              <a:t>If condition is FALSE, “display: none” is used to hide the content.   </a:t>
+            </a:r>
+          </a:p>
+        </p:txBody>
+      </p:sp>
     </p:spTree>
     <p:extLst>
       <p:ext uri="{BB962C8B-B14F-4D97-AF65-F5344CB8AC3E}">
-        <p14:creationId xmlns:p14="http://schemas.microsoft.com/office/powerpoint/2010/main" val="1576252531"/>
+        <p14:creationId xmlns:p14="http://schemas.microsoft.com/office/powerpoint/2010/main" val="2804014195"/>
       </p:ext>
     </p:extLst>
   </p:cSld>
@@ -6064,6 +6022,278 @@
           <p:cNvPr id="2" name="Title 1">
             <a:extLst>
               <a:ext uri="{FF2B5EF4-FFF2-40B4-BE49-F238E27FC236}">
+                <a16:creationId xmlns:a16="http://schemas.microsoft.com/office/drawing/2014/main" id="{39A2F1DC-827E-486D-8F7C-0C10080401D9}"/>
+              </a:ext>
+            </a:extLst>
+          </p:cNvPr>
+          <p:cNvSpPr>
+            <a:spLocks noGrp="1"/>
+          </p:cNvSpPr>
+          <p:nvPr>
+            <p:ph type="title"/>
+          </p:nvPr>
+        </p:nvSpPr>
+        <p:spPr/>
+        <p:txBody>
+          <a:bodyPr/>
+          <a:lstStyle/>
+          <a:p>
+            <a:r>
+              <a:rPr lang="en-US" dirty="0"/>
+              <a:t>Methods</a:t>
+            </a:r>
+          </a:p>
+        </p:txBody>
+      </p:sp>
+      <p:sp>
+        <p:nvSpPr>
+          <p:cNvPr id="3" name="Content Placeholder 2">
+            <a:extLst>
+              <a:ext uri="{FF2B5EF4-FFF2-40B4-BE49-F238E27FC236}">
+                <a16:creationId xmlns:a16="http://schemas.microsoft.com/office/drawing/2014/main" id="{2F05F660-3071-4BC2-8D9C-B97908EDF1E1}"/>
+              </a:ext>
+            </a:extLst>
+          </p:cNvPr>
+          <p:cNvSpPr>
+            <a:spLocks noGrp="1"/>
+          </p:cNvSpPr>
+          <p:nvPr>
+            <p:ph sz="half" idx="1"/>
+          </p:nvPr>
+        </p:nvSpPr>
+        <p:spPr/>
+        <p:txBody>
+          <a:bodyPr/>
+          <a:lstStyle/>
+          <a:p>
+            <a:r>
+              <a:rPr lang="en-US" dirty="0"/>
+              <a:t>Methods allow you to create event handlers that can be called directly from your templates.</a:t>
+            </a:r>
+          </a:p>
+        </p:txBody>
+      </p:sp>
+      <p:pic>
+        <p:nvPicPr>
+          <p:cNvPr id="6" name="Content Placeholder 5">
+            <a:extLst>
+              <a:ext uri="{FF2B5EF4-FFF2-40B4-BE49-F238E27FC236}">
+                <a16:creationId xmlns:a16="http://schemas.microsoft.com/office/drawing/2014/main" id="{D363BD9F-3BE7-4BE1-A961-EAAD07B4BB8B}"/>
+              </a:ext>
+            </a:extLst>
+          </p:cNvPr>
+          <p:cNvPicPr>
+            <a:picLocks noGrp="1" noChangeAspect="1"/>
+          </p:cNvPicPr>
+          <p:nvPr>
+            <p:ph sz="half" idx="2"/>
+          </p:nvPr>
+        </p:nvPicPr>
+        <p:blipFill>
+          <a:blip r:embed="rId2"/>
+          <a:stretch>
+            <a:fillRect/>
+          </a:stretch>
+        </p:blipFill>
+        <p:spPr>
+          <a:xfrm>
+            <a:off x="6172200" y="2430323"/>
+            <a:ext cx="5181600" cy="3141941"/>
+          </a:xfrm>
+        </p:spPr>
+      </p:pic>
+    </p:spTree>
+    <p:extLst>
+      <p:ext uri="{BB962C8B-B14F-4D97-AF65-F5344CB8AC3E}">
+        <p14:creationId xmlns:p14="http://schemas.microsoft.com/office/powerpoint/2010/main" val="1126114387"/>
+      </p:ext>
+    </p:extLst>
+  </p:cSld>
+  <p:clrMapOvr>
+    <a:masterClrMapping/>
+  </p:clrMapOvr>
+</p:sld>
+</file>
+
+<file path=ppt/slides/slide21.xml><?xml version="1.0" encoding="utf-8"?>
+<p:sld xmlns:a="http://schemas.openxmlformats.org/drawingml/2006/main" xmlns:r="http://schemas.openxmlformats.org/officeDocument/2006/relationships" xmlns:p="http://schemas.openxmlformats.org/presentationml/2006/main">
+  <p:cSld>
+    <p:spTree>
+      <p:nvGrpSpPr>
+        <p:cNvPr id="1" name=""/>
+        <p:cNvGrpSpPr/>
+        <p:nvPr/>
+      </p:nvGrpSpPr>
+      <p:grpSpPr>
+        <a:xfrm>
+          <a:off x="0" y="0"/>
+          <a:ext cx="0" cy="0"/>
+          <a:chOff x="0" y="0"/>
+          <a:chExt cx="0" cy="0"/>
+        </a:xfrm>
+      </p:grpSpPr>
+      <p:sp>
+        <p:nvSpPr>
+          <p:cNvPr id="2" name="Title 1">
+            <a:extLst>
+              <a:ext uri="{FF2B5EF4-FFF2-40B4-BE49-F238E27FC236}">
+                <a16:creationId xmlns:a16="http://schemas.microsoft.com/office/drawing/2014/main" id="{39A2F1DC-827E-486D-8F7C-0C10080401D9}"/>
+              </a:ext>
+            </a:extLst>
+          </p:cNvPr>
+          <p:cNvSpPr>
+            <a:spLocks noGrp="1"/>
+          </p:cNvSpPr>
+          <p:nvPr>
+            <p:ph type="title"/>
+          </p:nvPr>
+        </p:nvSpPr>
+        <p:spPr/>
+        <p:txBody>
+          <a:bodyPr/>
+          <a:lstStyle/>
+          <a:p>
+            <a:r>
+              <a:rPr lang="en-US" dirty="0"/>
+              <a:t>Methods</a:t>
+            </a:r>
+          </a:p>
+        </p:txBody>
+      </p:sp>
+      <p:pic>
+        <p:nvPicPr>
+          <p:cNvPr id="5" name="Content Placeholder 4">
+            <a:extLst>
+              <a:ext uri="{FF2B5EF4-FFF2-40B4-BE49-F238E27FC236}">
+                <a16:creationId xmlns:a16="http://schemas.microsoft.com/office/drawing/2014/main" id="{5F120647-64A1-4DB9-BF14-2FEA6E50A303}"/>
+              </a:ext>
+            </a:extLst>
+          </p:cNvPr>
+          <p:cNvPicPr>
+            <a:picLocks noGrp="1" noChangeAspect="1"/>
+          </p:cNvPicPr>
+          <p:nvPr>
+            <p:ph sz="half" idx="1"/>
+          </p:nvPr>
+        </p:nvPicPr>
+        <p:blipFill>
+          <a:blip r:embed="rId2"/>
+          <a:stretch>
+            <a:fillRect/>
+          </a:stretch>
+        </p:blipFill>
+        <p:spPr>
+          <a:xfrm>
+            <a:off x="838200" y="2899011"/>
+            <a:ext cx="5181600" cy="2204566"/>
+          </a:xfrm>
+        </p:spPr>
+      </p:pic>
+      <p:pic>
+        <p:nvPicPr>
+          <p:cNvPr id="6" name="Content Placeholder 5">
+            <a:extLst>
+              <a:ext uri="{FF2B5EF4-FFF2-40B4-BE49-F238E27FC236}">
+                <a16:creationId xmlns:a16="http://schemas.microsoft.com/office/drawing/2014/main" id="{D363BD9F-3BE7-4BE1-A961-EAAD07B4BB8B}"/>
+              </a:ext>
+            </a:extLst>
+          </p:cNvPr>
+          <p:cNvPicPr>
+            <a:picLocks noGrp="1" noChangeAspect="1"/>
+          </p:cNvPicPr>
+          <p:nvPr>
+            <p:ph sz="half" idx="2"/>
+          </p:nvPr>
+        </p:nvPicPr>
+        <p:blipFill>
+          <a:blip r:embed="rId3"/>
+          <a:stretch>
+            <a:fillRect/>
+          </a:stretch>
+        </p:blipFill>
+        <p:spPr>
+          <a:xfrm>
+            <a:off x="6172200" y="2430323"/>
+            <a:ext cx="5181600" cy="3141941"/>
+          </a:xfrm>
+        </p:spPr>
+      </p:pic>
+      <p:cxnSp>
+        <p:nvCxnSpPr>
+          <p:cNvPr id="8" name="Straight Arrow Connector 7">
+            <a:extLst>
+              <a:ext uri="{FF2B5EF4-FFF2-40B4-BE49-F238E27FC236}">
+                <a16:creationId xmlns:a16="http://schemas.microsoft.com/office/drawing/2014/main" id="{70849410-BB44-4C41-B69D-A202F2FEBF1E}"/>
+              </a:ext>
+            </a:extLst>
+          </p:cNvPr>
+          <p:cNvCxnSpPr>
+            <a:cxnSpLocks/>
+          </p:cNvCxnSpPr>
+          <p:nvPr/>
+        </p:nvCxnSpPr>
+        <p:spPr>
+          <a:xfrm>
+            <a:off x="2803490" y="3989196"/>
+            <a:ext cx="3808325" cy="351692"/>
+          </a:xfrm>
+          <a:prstGeom prst="straightConnector1">
+            <a:avLst/>
+          </a:prstGeom>
+          <a:ln w="57150">
+            <a:tailEnd type="triangle"/>
+          </a:ln>
+        </p:spPr>
+        <p:style>
+          <a:lnRef idx="1">
+            <a:schemeClr val="accent2"/>
+          </a:lnRef>
+          <a:fillRef idx="0">
+            <a:schemeClr val="accent2"/>
+          </a:fillRef>
+          <a:effectRef idx="0">
+            <a:schemeClr val="accent2"/>
+          </a:effectRef>
+          <a:fontRef idx="minor">
+            <a:schemeClr val="tx1"/>
+          </a:fontRef>
+        </p:style>
+      </p:cxnSp>
+    </p:spTree>
+    <p:extLst>
+      <p:ext uri="{BB962C8B-B14F-4D97-AF65-F5344CB8AC3E}">
+        <p14:creationId xmlns:p14="http://schemas.microsoft.com/office/powerpoint/2010/main" val="1576252531"/>
+      </p:ext>
+    </p:extLst>
+  </p:cSld>
+  <p:clrMapOvr>
+    <a:masterClrMapping/>
+  </p:clrMapOvr>
+</p:sld>
+</file>
+
+<file path=ppt/slides/slide22.xml><?xml version="1.0" encoding="utf-8"?>
+<p:sld xmlns:a="http://schemas.openxmlformats.org/drawingml/2006/main" xmlns:r="http://schemas.openxmlformats.org/officeDocument/2006/relationships" xmlns:p="http://schemas.openxmlformats.org/presentationml/2006/main">
+  <p:cSld>
+    <p:spTree>
+      <p:nvGrpSpPr>
+        <p:cNvPr id="1" name=""/>
+        <p:cNvGrpSpPr/>
+        <p:nvPr/>
+      </p:nvGrpSpPr>
+      <p:grpSpPr>
+        <a:xfrm>
+          <a:off x="0" y="0"/>
+          <a:ext cx="0" cy="0"/>
+          <a:chOff x="0" y="0"/>
+          <a:chExt cx="0" cy="0"/>
+        </a:xfrm>
+      </p:grpSpPr>
+      <p:sp>
+        <p:nvSpPr>
+          <p:cNvPr id="2" name="Title 1">
+            <a:extLst>
+              <a:ext uri="{FF2B5EF4-FFF2-40B4-BE49-F238E27FC236}">
                 <a16:creationId xmlns:a16="http://schemas.microsoft.com/office/drawing/2014/main" id="{900688BD-766D-41D2-84D8-A793AF57BEED}"/>
               </a:ext>
             </a:extLst>
@@ -6159,7 +6389,7 @@
 </p:sld>
 </file>
 
-<file path=ppt/slides/slide21.xml><?xml version="1.0" encoding="utf-8"?>
+<file path=ppt/slides/slide23.xml><?xml version="1.0" encoding="utf-8"?>
 <p:sld xmlns:a="http://schemas.openxmlformats.org/drawingml/2006/main" xmlns:r="http://schemas.openxmlformats.org/officeDocument/2006/relationships" xmlns:p="http://schemas.openxmlformats.org/presentationml/2006/main">
   <p:cSld>
     <p:spTree>
@@ -6304,7 +6534,7 @@
 </p:sld>
 </file>
 
-<file path=ppt/slides/slide22.xml><?xml version="1.0" encoding="utf-8"?>
+<file path=ppt/slides/slide24.xml><?xml version="1.0" encoding="utf-8"?>
 <p:sld xmlns:a="http://schemas.openxmlformats.org/drawingml/2006/main" xmlns:r="http://schemas.openxmlformats.org/officeDocument/2006/relationships" xmlns:p="http://schemas.openxmlformats.org/presentationml/2006/main">
   <p:cSld>
     <p:spTree>
@@ -6390,7 +6620,7 @@
 </p:sld>
 </file>
 
-<file path=ppt/slides/slide23.xml><?xml version="1.0" encoding="utf-8"?>
+<file path=ppt/slides/slide25.xml><?xml version="1.0" encoding="utf-8"?>
 <p:sld xmlns:a="http://schemas.openxmlformats.org/drawingml/2006/main" xmlns:r="http://schemas.openxmlformats.org/officeDocument/2006/relationships" xmlns:p="http://schemas.openxmlformats.org/presentationml/2006/main">
   <p:cSld>
     <p:spTree>
@@ -7319,57 +7549,6 @@
           </a:p>
         </p:txBody>
       </p:sp>
-      <mc:AlternateContent xmlns:mc="http://schemas.openxmlformats.org/markup-compatibility/2006">
-        <mc:Choice xmlns:p14="http://schemas.microsoft.com/office/powerpoint/2010/main" Requires="p14">
-          <p:contentPart p14:bwMode="auto" r:id="rId2">
-            <p14:nvContentPartPr>
-              <p14:cNvPr id="3" name="Ink 2">
-                <a:extLst>
-                  <a:ext uri="{FF2B5EF4-FFF2-40B4-BE49-F238E27FC236}">
-                    <a16:creationId xmlns:a16="http://schemas.microsoft.com/office/drawing/2014/main" id="{90F0B370-5556-4C0B-9BF5-5595D5EBE3D8}"/>
-                  </a:ext>
-                </a:extLst>
-              </p14:cNvPr>
-              <p14:cNvContentPartPr/>
-              <p14:nvPr/>
-            </p14:nvContentPartPr>
-            <p14:xfrm>
-              <a:off x="6127920" y="4724280"/>
-              <a:ext cx="1936800" cy="768960"/>
-            </p14:xfrm>
-          </p:contentPart>
-        </mc:Choice>
-        <mc:Fallback>
-          <p:pic>
-            <p:nvPicPr>
-              <p:cNvPr id="3" name="Ink 2">
-                <a:extLst>
-                  <a:ext uri="{FF2B5EF4-FFF2-40B4-BE49-F238E27FC236}">
-                    <a16:creationId xmlns:a16="http://schemas.microsoft.com/office/drawing/2014/main" id="{90F0B370-5556-4C0B-9BF5-5595D5EBE3D8}"/>
-                  </a:ext>
-                </a:extLst>
-              </p:cNvPr>
-              <p:cNvPicPr/>
-              <p:nvPr/>
-            </p:nvPicPr>
-            <p:blipFill>
-              <a:blip r:embed="rId3"/>
-              <a:stretch>
-                <a:fillRect/>
-              </a:stretch>
-            </p:blipFill>
-            <p:spPr>
-              <a:xfrm>
-                <a:off x="6118560" y="4714920"/>
-                <a:ext cx="1955520" cy="787680"/>
-              </a:xfrm>
-              <a:prstGeom prst="rect">
-                <a:avLst/>
-              </a:prstGeom>
-            </p:spPr>
-          </p:pic>
-        </mc:Fallback>
-      </mc:AlternateContent>
     </p:spTree>
     <p:extLst>
       <p:ext uri="{BB962C8B-B14F-4D97-AF65-F5344CB8AC3E}">

</xml_diff>